<commit_message>
added D405 camera support, and recalibrate for that camera
</commit_message>
<xml_diff>
--- a/Monday Meeting PPT/2022.11.21.pptx
+++ b/Monday Meeting PPT/2022.11.21.pptx
@@ -200,7 +200,7 @@
           <a:p>
             <a:fld id="{3BDDF6A6-26E4-A148-A675-C6510ADE547D}" type="datetimeFigureOut">
               <a:rPr lang="en-US" smtClean="0"/>
-              <a:t>11/20/2022</a:t>
+              <a:t>12/5/2022</a:t>
             </a:fld>
             <a:endParaRPr lang="en-US"/>
           </a:p>
@@ -501,7 +501,7 @@
           <a:p>
             <a:fld id="{D997B5FA-0921-464F-AAE1-844C04324D75}" type="datetimeFigureOut">
               <a:rPr lang="zh-CN" altLang="en-US" smtClean="0"/>
-              <a:t>2022/11/20</a:t>
+              <a:t>2022/12/5</a:t>
             </a:fld>
             <a:endParaRPr lang="zh-CN" altLang="en-US"/>
           </a:p>
@@ -779,7 +779,7 @@
           <a:p>
             <a:fld id="{D997B5FA-0921-464F-AAE1-844C04324D75}" type="datetimeFigureOut">
               <a:rPr lang="zh-CN" altLang="en-US" smtClean="0"/>
-              <a:t>2022/11/20</a:t>
+              <a:t>2022/12/5</a:t>
             </a:fld>
             <a:endParaRPr lang="zh-CN" altLang="en-US"/>
           </a:p>
@@ -958,7 +958,7 @@
           <a:p>
             <a:fld id="{D997B5FA-0921-464F-AAE1-844C04324D75}" type="datetimeFigureOut">
               <a:rPr lang="zh-CN" altLang="en-US" smtClean="0"/>
-              <a:t>2022/11/20</a:t>
+              <a:t>2022/12/5</a:t>
             </a:fld>
             <a:endParaRPr lang="zh-CN" altLang="en-US"/>
           </a:p>
@@ -1137,7 +1137,7 @@
           <a:p>
             <a:fld id="{D997B5FA-0921-464F-AAE1-844C04324D75}" type="datetimeFigureOut">
               <a:rPr lang="zh-CN" altLang="en-US" smtClean="0"/>
-              <a:t>2022/11/20</a:t>
+              <a:t>2022/12/5</a:t>
             </a:fld>
             <a:endParaRPr lang="zh-CN" altLang="en-US"/>
           </a:p>
@@ -1383,7 +1383,7 @@
           <a:p>
             <a:fld id="{D997B5FA-0921-464F-AAE1-844C04324D75}" type="datetimeFigureOut">
               <a:rPr lang="zh-CN" altLang="en-US" smtClean="0"/>
-              <a:t>2022/11/20</a:t>
+              <a:t>2022/12/5</a:t>
             </a:fld>
             <a:endParaRPr lang="zh-CN" altLang="en-US"/>
           </a:p>
@@ -1621,7 +1621,7 @@
           <a:p>
             <a:fld id="{D997B5FA-0921-464F-AAE1-844C04324D75}" type="datetimeFigureOut">
               <a:rPr lang="zh-CN" altLang="en-US" smtClean="0"/>
-              <a:t>2022/11/20</a:t>
+              <a:t>2022/12/5</a:t>
             </a:fld>
             <a:endParaRPr lang="zh-CN" altLang="en-US"/>
           </a:p>
@@ -1995,7 +1995,7 @@
           <a:p>
             <a:fld id="{D997B5FA-0921-464F-AAE1-844C04324D75}" type="datetimeFigureOut">
               <a:rPr lang="zh-CN" altLang="en-US" smtClean="0"/>
-              <a:t>2022/11/20</a:t>
+              <a:t>2022/12/5</a:t>
             </a:fld>
             <a:endParaRPr lang="zh-CN" altLang="en-US"/>
           </a:p>
@@ -2115,7 +2115,7 @@
           <a:p>
             <a:fld id="{D997B5FA-0921-464F-AAE1-844C04324D75}" type="datetimeFigureOut">
               <a:rPr lang="zh-CN" altLang="en-US" smtClean="0"/>
-              <a:t>2022/11/20</a:t>
+              <a:t>2022/12/5</a:t>
             </a:fld>
             <a:endParaRPr lang="zh-CN" altLang="en-US"/>
           </a:p>
@@ -2205,7 +2205,7 @@
           <a:p>
             <a:fld id="{D997B5FA-0921-464F-AAE1-844C04324D75}" type="datetimeFigureOut">
               <a:rPr lang="zh-CN" altLang="en-US" smtClean="0"/>
-              <a:t>2022/11/20</a:t>
+              <a:t>2022/12/5</a:t>
             </a:fld>
             <a:endParaRPr lang="zh-CN" altLang="en-US"/>
           </a:p>
@@ -2508,7 +2508,7 @@
           <a:p>
             <a:fld id="{D997B5FA-0921-464F-AAE1-844C04324D75}" type="datetimeFigureOut">
               <a:rPr lang="zh-CN" altLang="en-US" smtClean="0"/>
-              <a:t>2022/11/20</a:t>
+              <a:t>2022/12/5</a:t>
             </a:fld>
             <a:endParaRPr lang="zh-CN" altLang="en-US"/>
           </a:p>
@@ -2764,7 +2764,7 @@
           <a:p>
             <a:fld id="{D997B5FA-0921-464F-AAE1-844C04324D75}" type="datetimeFigureOut">
               <a:rPr lang="zh-CN" altLang="en-US" smtClean="0"/>
-              <a:t>2022/11/20</a:t>
+              <a:t>2022/12/5</a:t>
             </a:fld>
             <a:endParaRPr lang="zh-CN" altLang="en-US"/>
           </a:p>
@@ -2877,7 +2877,7 @@
           <a:p>
             <a:fld id="{D997B5FA-0921-464F-AAE1-844C04324D75}" type="datetimeFigureOut">
               <a:rPr lang="zh-CN" altLang="en-US" smtClean="0"/>
-              <a:t>2022/11/20</a:t>
+              <a:t>2022/12/5</a:t>
             </a:fld>
             <a:endParaRPr lang="zh-CN" altLang="en-US"/>
           </a:p>
@@ -3616,7 +3616,127 @@
                 </a:solidFill>
                 <a:latin typeface="Calibri" panose="020F0502020204030204" pitchFamily="34" charset="0"/>
               </a:rPr>
-              <a:t>Marker Detection</a:t>
+              <a:t>Camera Calibration</a:t>
+            </a:r>
+            <a:endParaRPr lang="en-GB" altLang="zh-CN" dirty="0">
+              <a:solidFill>
+                <a:srgbClr val="000000"/>
+              </a:solidFill>
+              <a:latin typeface="Calibri" panose="020F0502020204030204" pitchFamily="34" charset="0"/>
+            </a:endParaRPr>
+          </a:p>
+          <a:p>
+            <a:pPr marL="285750" indent="-285750" fontAlgn="base">
+              <a:buFont typeface="Arial" panose="020B0604020202020204" pitchFamily="34" charset="0"/>
+              <a:buChar char="•"/>
+            </a:pPr>
+            <a:r>
+              <a:rPr lang="en-US" altLang="zh-CN" dirty="0">
+                <a:solidFill>
+                  <a:srgbClr val="000000"/>
+                </a:solidFill>
+                <a:latin typeface="Calibri" panose="020F0502020204030204" pitchFamily="34" charset="0"/>
+              </a:rPr>
+              <a:t>Search for calibration method from official documentations</a:t>
+            </a:r>
+          </a:p>
+          <a:p>
+            <a:pPr marL="285750" indent="-285750" fontAlgn="base">
+              <a:buFont typeface="Arial" panose="020B0604020202020204" pitchFamily="34" charset="0"/>
+              <a:buChar char="•"/>
+            </a:pPr>
+            <a:r>
+              <a:rPr lang="en-US" altLang="zh-CN" dirty="0">
+                <a:solidFill>
+                  <a:srgbClr val="000000"/>
+                </a:solidFill>
+                <a:latin typeface="Calibri" panose="020F0502020204030204" pitchFamily="34" charset="0"/>
+              </a:rPr>
+              <a:t>Tried calibrating the camera with On-chip calibration</a:t>
+            </a:r>
+          </a:p>
+          <a:p>
+            <a:pPr marL="285750" indent="-285750" fontAlgn="base">
+              <a:buFont typeface="Arial" panose="020B0604020202020204" pitchFamily="34" charset="0"/>
+              <a:buChar char="•"/>
+            </a:pPr>
+            <a:r>
+              <a:rPr lang="en-US" altLang="zh-CN" dirty="0">
+                <a:solidFill>
+                  <a:srgbClr val="000000"/>
+                </a:solidFill>
+                <a:latin typeface="Calibri" panose="020F0502020204030204" pitchFamily="34" charset="0"/>
+              </a:rPr>
+              <a:t>Tried focus-length calibration and tare calibration</a:t>
+            </a:r>
+          </a:p>
+          <a:p>
+            <a:pPr fontAlgn="base"/>
+            <a:endParaRPr lang="en-US" altLang="zh-CN" dirty="0">
+              <a:solidFill>
+                <a:srgbClr val="000000"/>
+              </a:solidFill>
+              <a:latin typeface="Calibri" panose="020F0502020204030204" pitchFamily="34" charset="0"/>
+            </a:endParaRPr>
+          </a:p>
+          <a:p>
+            <a:pPr fontAlgn="base"/>
+            <a:r>
+              <a:rPr lang="en-US" altLang="zh-CN" dirty="0">
+                <a:solidFill>
+                  <a:srgbClr val="000000"/>
+                </a:solidFill>
+                <a:latin typeface="Calibri" panose="020F0502020204030204" pitchFamily="34" charset="0"/>
+                <a:hlinkClick r:id="rId2"/>
+              </a:rPr>
+              <a:t>Official Documentation</a:t>
+            </a:r>
+            <a:endParaRPr lang="en-US" altLang="zh-CN" dirty="0">
+              <a:solidFill>
+                <a:srgbClr val="000000"/>
+              </a:solidFill>
+              <a:latin typeface="Calibri" panose="020F0502020204030204" pitchFamily="34" charset="0"/>
+            </a:endParaRPr>
+          </a:p>
+          <a:p>
+            <a:pPr fontAlgn="base"/>
+            <a:endParaRPr lang="en-US" altLang="zh-CN" dirty="0">
+              <a:solidFill>
+                <a:srgbClr val="000000"/>
+              </a:solidFill>
+              <a:latin typeface="Calibri" panose="020F0502020204030204" pitchFamily="34" charset="0"/>
+            </a:endParaRPr>
+          </a:p>
+          <a:p>
+            <a:pPr algn="l" rtl="0" fontAlgn="base"/>
+            <a:r>
+              <a:rPr lang="en-US" altLang="zh-CN" sz="1800" b="0" i="0" dirty="0">
+                <a:solidFill>
+                  <a:srgbClr val="2E75B5"/>
+                </a:solidFill>
+                <a:effectLst/>
+                <a:latin typeface="Calibri" panose="020F0502020204030204" pitchFamily="34" charset="0"/>
+              </a:rPr>
+              <a:t>PPT </a:t>
+            </a:r>
+            <a:r>
+              <a:rPr lang="en-US" altLang="zh-CN" dirty="0">
+                <a:solidFill>
+                  <a:srgbClr val="2E75B5"/>
+                </a:solidFill>
+                <a:latin typeface="Calibri" panose="020F0502020204030204" pitchFamily="34" charset="0"/>
+              </a:rPr>
+              <a:t>M</a:t>
+            </a:r>
+            <a:r>
+              <a:rPr lang="en-US" altLang="zh-CN" sz="1800" b="0" i="0" dirty="0">
+                <a:solidFill>
+                  <a:srgbClr val="2E75B5"/>
+                </a:solidFill>
+                <a:effectLst/>
+                <a:latin typeface="Calibri" panose="020F0502020204030204" pitchFamily="34" charset="0"/>
+              </a:rPr>
+              <a:t>aking</a:t>
             </a:r>
             <a:endParaRPr lang="en-US" altLang="zh-CN" sz="1800" b="0" i="0" dirty="0">
               <a:solidFill>
@@ -3638,105 +3758,8 @@
                 </a:solidFill>
                 <a:latin typeface="Calibri" panose="020F0502020204030204" pitchFamily="34" charset="0"/>
               </a:rPr>
-              <a:t>Solved the </a:t>
-            </a:r>
-            <a:r>
-              <a:rPr lang="en-GB" altLang="zh-CN" dirty="0" err="1">
-                <a:solidFill>
-                  <a:srgbClr val="000000"/>
-                </a:solidFill>
-                <a:latin typeface="Calibri" panose="020F0502020204030204" pitchFamily="34" charset="0"/>
-              </a:rPr>
-              <a:t>x,y</a:t>
-            </a:r>
-            <a:r>
-              <a:rPr lang="en-GB" altLang="zh-CN" dirty="0">
-                <a:solidFill>
-                  <a:srgbClr val="000000"/>
-                </a:solidFill>
-                <a:latin typeface="Calibri" panose="020F0502020204030204" pitchFamily="34" charset="0"/>
-              </a:rPr>
-              <a:t> shift problem found last week</a:t>
-            </a:r>
-          </a:p>
-          <a:p>
-            <a:pPr algn="l" rtl="0" fontAlgn="base"/>
-            <a:endParaRPr lang="en-GB" altLang="zh-CN" dirty="0">
-              <a:solidFill>
-                <a:srgbClr val="000000"/>
-              </a:solidFill>
-              <a:latin typeface="Calibri" panose="020F0502020204030204" pitchFamily="34" charset="0"/>
-            </a:endParaRPr>
-          </a:p>
-          <a:p>
-            <a:pPr fontAlgn="base"/>
-            <a:r>
-              <a:rPr lang="en-US" altLang="zh-CN" dirty="0">
-                <a:solidFill>
-                  <a:srgbClr val="2E75B5"/>
-                </a:solidFill>
-                <a:latin typeface="Calibri" panose="020F0502020204030204" pitchFamily="34" charset="0"/>
-              </a:rPr>
-              <a:t>Marker Detection test with the lens</a:t>
-            </a:r>
-          </a:p>
-          <a:p>
-            <a:pPr marL="285750" indent="-285750" fontAlgn="base">
-              <a:buFont typeface="Arial" panose="020B0604020202020204" pitchFamily="34" charset="0"/>
-              <a:buChar char="•"/>
-            </a:pPr>
-            <a:r>
-              <a:rPr lang="en-GB" altLang="zh-CN" dirty="0">
-                <a:solidFill>
-                  <a:srgbClr val="000000"/>
-                </a:solidFill>
-                <a:latin typeface="Calibri" panose="020F0502020204030204" pitchFamily="34" charset="0"/>
-              </a:rPr>
-              <a:t>The same program appears to still function even with the lens attached.</a:t>
-            </a:r>
-          </a:p>
-          <a:p>
-            <a:pPr marL="285750" indent="-285750" fontAlgn="base">
-              <a:buFont typeface="Arial" panose="020B0604020202020204" pitchFamily="34" charset="0"/>
-              <a:buChar char="•"/>
-            </a:pPr>
-            <a:r>
-              <a:rPr lang="en-GB" altLang="zh-CN" dirty="0">
-                <a:solidFill>
-                  <a:srgbClr val="000000"/>
-                </a:solidFill>
-                <a:latin typeface="Calibri" panose="020F0502020204030204" pitchFamily="34" charset="0"/>
-              </a:rPr>
-              <a:t>Not able to solve the RGB-D calibration</a:t>
-            </a:r>
-          </a:p>
-          <a:p>
-            <a:pPr fontAlgn="base"/>
-            <a:endParaRPr lang="en-US" altLang="zh-CN" dirty="0">
-              <a:solidFill>
-                <a:srgbClr val="2E75B5"/>
-              </a:solidFill>
-              <a:latin typeface="Calibri" panose="020F0502020204030204" pitchFamily="34" charset="0"/>
-            </a:endParaRPr>
-          </a:p>
-          <a:p>
-            <a:pPr algn="l" rtl="0" fontAlgn="base"/>
-            <a:r>
-              <a:rPr lang="en-US" altLang="zh-CN" dirty="0">
-                <a:solidFill>
-                  <a:srgbClr val="2E75B5"/>
-                </a:solidFill>
-                <a:latin typeface="Calibri" panose="020F0502020204030204" pitchFamily="34" charset="0"/>
-              </a:rPr>
-              <a:t>GUI design</a:t>
-            </a:r>
-            <a:endParaRPr lang="en-US" altLang="zh-CN" sz="1800" b="0" i="0" dirty="0">
-              <a:solidFill>
-                <a:srgbClr val="000000"/>
-              </a:solidFill>
-              <a:effectLst/>
-              <a:latin typeface="Calibri" panose="020F0502020204030204" pitchFamily="34" charset="0"/>
-            </a:endParaRPr>
+              <a:t>Make a template and theme of the ppt</a:t>
+            </a:r>
           </a:p>
           <a:p>
             <a:pPr marL="285750" indent="-285750" algn="l" rtl="0" fontAlgn="base">
@@ -3750,7 +3773,7 @@
                 </a:solidFill>
                 <a:latin typeface="Calibri" panose="020F0502020204030204" pitchFamily="34" charset="0"/>
               </a:rPr>
-              <a:t>Looked up GUI libraries and discussed which to be used</a:t>
+              <a:t>Put the recordings of past weeks’ results into the PPT</a:t>
             </a:r>
           </a:p>
           <a:p>
@@ -3765,27 +3788,8 @@
                 </a:solidFill>
                 <a:latin typeface="Calibri" panose="020F0502020204030204" pitchFamily="34" charset="0"/>
               </a:rPr>
-              <a:t>Decided how to visualize the pose</a:t>
-            </a:r>
-          </a:p>
-          <a:p>
-            <a:pPr marL="285750" indent="-285750" fontAlgn="base">
-              <a:buFont typeface="Arial" panose="020B0604020202020204" pitchFamily="34" charset="0"/>
-              <a:buChar char="•"/>
-            </a:pPr>
-            <a:r>
-              <a:rPr lang="en-US" sz="1800" dirty="0">
-                <a:effectLst/>
-                <a:latin typeface="Calibri" panose="020F0502020204030204" pitchFamily="34" charset="0"/>
-              </a:rPr>
-              <a:t>Added some GUI functions</a:t>
-            </a:r>
-            <a:endParaRPr lang="en-GB" altLang="zh-CN" dirty="0">
-              <a:solidFill>
-                <a:srgbClr val="000000"/>
-              </a:solidFill>
-              <a:latin typeface="Calibri" panose="020F0502020204030204" pitchFamily="34" charset="0"/>
-            </a:endParaRPr>
+              <a:t>Make first draft of the ppt</a:t>
+            </a:r>
           </a:p>
           <a:p>
             <a:pPr algn="l" rtl="0" fontAlgn="base"/>
@@ -3943,7 +3947,7 @@
         <p:spPr>
           <a:xfrm>
             <a:off x="310515" y="270510"/>
-            <a:ext cx="2449195" cy="460375"/>
+            <a:ext cx="2395336" cy="461665"/>
           </a:xfrm>
           <a:prstGeom prst="rect">
             <a:avLst/>
@@ -3969,8 +3973,26 @@
                 <a:latin typeface="Calibri" panose="020F0502020204030204" pitchFamily="34" charset="0"/>
                 <a:sym typeface="+mn-ea"/>
               </a:rPr>
-              <a:t>Plan for this week</a:t>
-            </a:r>
+              <a:t>Plan for </a:t>
+            </a:r>
+            <a:r>
+              <a:rPr lang="en-US" sz="2400" b="1" dirty="0">
+                <a:solidFill>
+                  <a:srgbClr val="000000"/>
+                </a:solidFill>
+                <a:latin typeface="Calibri" panose="020F0502020204030204" pitchFamily="34" charset="0"/>
+                <a:sym typeface="+mn-ea"/>
+              </a:rPr>
+              <a:t>finalizing</a:t>
+            </a:r>
+            <a:endParaRPr lang="en-US" sz="2400" b="1" dirty="0">
+              <a:solidFill>
+                <a:srgbClr val="000000"/>
+              </a:solidFill>
+              <a:effectLst/>
+              <a:latin typeface="Calibri" panose="020F0502020204030204" pitchFamily="34" charset="0"/>
+              <a:sym typeface="+mn-ea"/>
+            </a:endParaRPr>
           </a:p>
         </p:txBody>
       </p:sp>
@@ -3982,7 +4004,7 @@
         </p:nvSpPr>
         <p:spPr>
           <a:xfrm>
-            <a:off x="369570" y="2072640"/>
+            <a:off x="369570" y="2125906"/>
             <a:ext cx="11057890" cy="2204899"/>
           </a:xfrm>
           <a:prstGeom prst="rect">
@@ -4008,30 +4030,11 @@
                 <a:solidFill>
                   <a:srgbClr val="000000"/>
                 </a:solidFill>
-                <a:effectLst/>
                 <a:latin typeface="Calibri" panose="020F0502020204030204" pitchFamily="34" charset="0"/>
                 <a:sym typeface="+mn-ea"/>
               </a:rPr>
-              <a:t>Complete pose calculation based on </a:t>
-            </a:r>
-            <a:r>
-              <a:rPr lang="en-US" altLang="x-none" sz="2400" dirty="0" err="1">
-                <a:solidFill>
-                  <a:srgbClr val="000000"/>
-                </a:solidFill>
-                <a:effectLst/>
-                <a:latin typeface="Calibri" panose="020F0502020204030204" pitchFamily="34" charset="0"/>
-                <a:sym typeface="+mn-ea"/>
-              </a:rPr>
-              <a:t>Aruco</a:t>
-            </a:r>
-            <a:endParaRPr lang="en-US" altLang="x-none" sz="2400" dirty="0">
-              <a:solidFill>
-                <a:srgbClr val="000000"/>
-              </a:solidFill>
-              <a:latin typeface="Calibri" panose="020F0502020204030204" pitchFamily="34" charset="0"/>
-              <a:sym typeface="+mn-ea"/>
-            </a:endParaRPr>
+              <a:t>Refactor and manage all codes to improve readability</a:t>
+            </a:r>
           </a:p>
           <a:p>
             <a:pPr marL="457200" indent="-457200" fontAlgn="auto">
@@ -4050,26 +4053,8 @@
                 <a:latin typeface="Calibri" panose="020F0502020204030204" pitchFamily="34" charset="0"/>
                 <a:sym typeface="+mn-ea"/>
               </a:rPr>
-              <a:t>Sensing area </a:t>
-            </a:r>
-            <a:r>
-              <a:rPr lang="en-US" altLang="x-none" sz="2400" dirty="0">
-                <a:solidFill>
-                  <a:srgbClr val="000000"/>
-                </a:solidFill>
-                <a:latin typeface="Calibri" panose="020F0502020204030204" pitchFamily="34" charset="0"/>
-                <a:sym typeface="+mn-ea"/>
-              </a:rPr>
-              <a:t>calculation</a:t>
-            </a:r>
-            <a:endParaRPr lang="en-US" altLang="x-none" sz="2400" dirty="0">
-              <a:solidFill>
-                <a:srgbClr val="000000"/>
-              </a:solidFill>
-              <a:effectLst/>
-              <a:latin typeface="Calibri" panose="020F0502020204030204" pitchFamily="34" charset="0"/>
-              <a:sym typeface="+mn-ea"/>
-            </a:endParaRPr>
+              <a:t>Collect and present all results for each objective.</a:t>
+            </a:r>
           </a:p>
           <a:p>
             <a:pPr marL="457200" indent="-457200" fontAlgn="auto">
@@ -4087,7 +4072,27 @@
                 <a:latin typeface="Calibri" panose="020F0502020204030204" pitchFamily="34" charset="0"/>
                 <a:sym typeface="+mn-ea"/>
               </a:rPr>
-              <a:t>GUI design</a:t>
+              <a:t>Finalize </a:t>
+            </a:r>
+            <a:r>
+              <a:rPr lang="en-US" altLang="x-none" sz="2400" dirty="0" err="1">
+                <a:solidFill>
+                  <a:srgbClr val="000000"/>
+                </a:solidFill>
+                <a:latin typeface="Calibri" panose="020F0502020204030204" pitchFamily="34" charset="0"/>
+                <a:sym typeface="+mn-ea"/>
+              </a:rPr>
+              <a:t>Gui</a:t>
+            </a:r>
+            <a:r>
+              <a:rPr lang="en-US" altLang="x-none" sz="2400" dirty="0">
+                <a:solidFill>
+                  <a:srgbClr val="000000"/>
+                </a:solidFill>
+                <a:latin typeface="Calibri" panose="020F0502020204030204" pitchFamily="34" charset="0"/>
+                <a:sym typeface="+mn-ea"/>
+              </a:rPr>
+              <a:t> </a:t>
             </a:r>
           </a:p>
         </p:txBody>
@@ -4126,7 +4131,7 @@
         <p:spPr>
           <a:xfrm>
             <a:off x="310515" y="832068"/>
-            <a:ext cx="8074567" cy="5755422"/>
+            <a:ext cx="8074567" cy="3539430"/>
           </a:xfrm>
           <a:prstGeom prst="rect">
             <a:avLst/>
@@ -4148,38 +4153,18 @@
               </a:spcAft>
             </a:pPr>
             <a:r>
-              <a:rPr lang="en-GB" sz="1600" b="1" dirty="0">
+              <a:rPr lang="en-US" sz="1600" b="1" dirty="0">
                 <a:solidFill>
                   <a:srgbClr val="2E75B5"/>
                 </a:solidFill>
                 <a:effectLst/>
                 <a:latin typeface="Calibri" panose="020F0502020204030204" pitchFamily="34" charset="0"/>
               </a:rPr>
-              <a:t>2022/11/</a:t>
-            </a:r>
-            <a:r>
-              <a:rPr lang="en-US" sz="1600" b="1" dirty="0">
-                <a:solidFill>
-                  <a:srgbClr val="2E75B5"/>
-                </a:solidFill>
-                <a:effectLst/>
-                <a:latin typeface="Calibri" panose="020F0502020204030204" pitchFamily="34" charset="0"/>
-              </a:rPr>
-              <a:t>14</a:t>
-            </a:r>
-            <a:r>
-              <a:rPr lang="en-GB" sz="1600" b="1" dirty="0">
-                <a:solidFill>
-                  <a:srgbClr val="2E75B5"/>
-                </a:solidFill>
-                <a:effectLst/>
-                <a:latin typeface="Calibri" panose="020F0502020204030204" pitchFamily="34" charset="0"/>
-              </a:rPr>
-              <a:t> (2pm — 6pm)</a:t>
-            </a:r>
-          </a:p>
-          <a:p>
-            <a:pPr rtl="0" fontAlgn="ctr">
+              <a:t>2022/11/28 2pm-6pm</a:t>
+            </a:r>
+          </a:p>
+          <a:p>
+            <a:pPr marL="285750" marR="0" indent="-285750">
               <a:spcBef>
                 <a:spcPts val="0"/>
               </a:spcBef>
@@ -4191,14 +4176,31 @@
             </a:pPr>
             <a:r>
               <a:rPr lang="en-US" sz="1600" dirty="0">
-                <a:effectLst/>
+                <a:solidFill>
+                  <a:srgbClr val="000000"/>
+                </a:solidFill>
                 <a:latin typeface="Calibri" panose="020F0502020204030204" pitchFamily="34" charset="0"/>
               </a:rPr>
-              <a:t>Project meeting with Prof. Dan </a:t>
-            </a:r>
-          </a:p>
-          <a:p>
-            <a:pPr rtl="0" fontAlgn="ctr">
+              <a:t>Meeting with </a:t>
+            </a:r>
+            <a:r>
+              <a:rPr lang="en-US" sz="1600" dirty="0" err="1">
+                <a:solidFill>
+                  <a:srgbClr val="000000"/>
+                </a:solidFill>
+                <a:latin typeface="Calibri" panose="020F0502020204030204" pitchFamily="34" charset="0"/>
+              </a:rPr>
+              <a:t>Dr.Daniel</a:t>
+            </a:r>
+            <a:endParaRPr lang="en-US" sz="1600" dirty="0">
+              <a:solidFill>
+                <a:srgbClr val="000000"/>
+              </a:solidFill>
+              <a:latin typeface="Calibri" panose="020F0502020204030204" pitchFamily="34" charset="0"/>
+            </a:endParaRPr>
+          </a:p>
+          <a:p>
+            <a:pPr marL="285750" marR="0" indent="-285750">
               <a:spcBef>
                 <a:spcPts val="0"/>
               </a:spcBef>
@@ -4210,28 +4212,16 @@
             </a:pPr>
             <a:r>
               <a:rPr lang="en-US" sz="1600" dirty="0">
-                <a:effectLst/>
+                <a:solidFill>
+                  <a:srgbClr val="000000"/>
+                </a:solidFill>
                 <a:latin typeface="Calibri" panose="020F0502020204030204" pitchFamily="34" charset="0"/>
               </a:rPr>
-              <a:t>Solved the </a:t>
-            </a:r>
-            <a:r>
-              <a:rPr lang="en-US" sz="1600" dirty="0" err="1">
-                <a:effectLst/>
-                <a:latin typeface="Calibri" panose="020F0502020204030204" pitchFamily="34" charset="0"/>
-              </a:rPr>
-              <a:t>x,y</a:t>
-            </a:r>
-            <a:r>
-              <a:rPr lang="en-US" sz="1600" dirty="0">
-                <a:effectLst/>
-                <a:latin typeface="Calibri" panose="020F0502020204030204" pitchFamily="34" charset="0"/>
-              </a:rPr>
-              <a:t> shift problem found last week</a:t>
-            </a:r>
-          </a:p>
-          <a:p>
-            <a:pPr rtl="0" fontAlgn="ctr">
+              <a:t>Implement the problem we meet for find the depth and position of probe and coordinates</a:t>
+            </a:r>
+          </a:p>
+          <a:p>
+            <a:pPr marL="285750" marR="0" indent="-285750">
               <a:spcBef>
                 <a:spcPts val="0"/>
               </a:spcBef>
@@ -4243,56 +4233,128 @@
             </a:pPr>
             <a:r>
               <a:rPr lang="en-US" sz="1600" dirty="0">
+                <a:solidFill>
+                  <a:srgbClr val="000000"/>
+                </a:solidFill>
+                <a:latin typeface="Calibri" panose="020F0502020204030204" pitchFamily="34" charset="0"/>
+              </a:rPr>
+              <a:t>Discussion with </a:t>
+            </a:r>
+            <a:r>
+              <a:rPr lang="en-US" sz="1600" dirty="0" err="1">
+                <a:solidFill>
+                  <a:srgbClr val="000000"/>
+                </a:solidFill>
+                <a:latin typeface="Calibri" panose="020F0502020204030204" pitchFamily="34" charset="0"/>
+              </a:rPr>
+              <a:t>kaizhong</a:t>
+            </a:r>
+            <a:r>
+              <a:rPr lang="en-US" sz="1600" dirty="0">
+                <a:solidFill>
+                  <a:srgbClr val="000000"/>
+                </a:solidFill>
+                <a:latin typeface="Calibri" panose="020F0502020204030204" pitchFamily="34" charset="0"/>
+              </a:rPr>
+              <a:t> about the calibration problem with lens</a:t>
+            </a:r>
+          </a:p>
+          <a:p>
+            <a:pPr marR="0">
+              <a:spcBef>
+                <a:spcPts val="0"/>
+              </a:spcBef>
+              <a:spcAft>
+                <a:spcPts val="0"/>
+              </a:spcAft>
+            </a:pPr>
+            <a:endParaRPr lang="en-US" sz="1600" dirty="0">
+              <a:solidFill>
+                <a:srgbClr val="000000"/>
+              </a:solidFill>
+              <a:latin typeface="Calibri" panose="020F0502020204030204" pitchFamily="34" charset="0"/>
+            </a:endParaRPr>
+          </a:p>
+          <a:p>
+            <a:pPr marL="0" marR="0">
+              <a:spcBef>
+                <a:spcPts val="0"/>
+              </a:spcBef>
+              <a:spcAft>
+                <a:spcPts val="0"/>
+              </a:spcAft>
+            </a:pPr>
+            <a:r>
+              <a:rPr lang="en-US" sz="1600" b="1" dirty="0">
+                <a:solidFill>
+                  <a:srgbClr val="2E75B5"/>
+                </a:solidFill>
                 <a:effectLst/>
                 <a:latin typeface="Calibri" panose="020F0502020204030204" pitchFamily="34" charset="0"/>
               </a:rPr>
-              <a:t>Changed the code to detect </a:t>
-            </a:r>
-            <a:r>
-              <a:rPr lang="en-US" sz="1600" dirty="0" err="1">
+              <a:t>2022/12/01 10am-1pm</a:t>
+            </a:r>
+          </a:p>
+          <a:p>
+            <a:pPr marL="285750" indent="-285750">
+              <a:buFont typeface="Arial" panose="020B0604020202020204" pitchFamily="34" charset="0"/>
+              <a:buChar char="•"/>
+            </a:pPr>
+            <a:r>
+              <a:rPr lang="en-US" sz="1600" dirty="0">
+                <a:solidFill>
+                  <a:srgbClr val="000000"/>
+                </a:solidFill>
+                <a:latin typeface="Calibri" panose="020F0502020204030204" pitchFamily="34" charset="0"/>
+              </a:rPr>
+              <a:t>Finish making the PPT template</a:t>
+            </a:r>
+          </a:p>
+          <a:p>
+            <a:pPr marL="285750" indent="-285750">
+              <a:buFont typeface="Arial" panose="020B0604020202020204" pitchFamily="34" charset="0"/>
+              <a:buChar char="•"/>
+            </a:pPr>
+            <a:r>
+              <a:rPr lang="en-US" sz="1600" dirty="0">
+                <a:solidFill>
+                  <a:srgbClr val="000000"/>
+                </a:solidFill>
+                <a:latin typeface="Calibri" panose="020F0502020204030204" pitchFamily="34" charset="0"/>
+              </a:rPr>
+              <a:t>Try some way to fix the problem based on the original code</a:t>
+            </a:r>
+          </a:p>
+          <a:p>
+            <a:endParaRPr lang="en-US" sz="1600" dirty="0">
+              <a:solidFill>
+                <a:srgbClr val="000000"/>
+              </a:solidFill>
+              <a:latin typeface="Calibri" panose="020F0502020204030204" pitchFamily="34" charset="0"/>
+            </a:endParaRPr>
+          </a:p>
+          <a:p>
+            <a:pPr marL="0" marR="0">
+              <a:spcBef>
+                <a:spcPts val="0"/>
+              </a:spcBef>
+              <a:spcAft>
+                <a:spcPts val="0"/>
+              </a:spcAft>
+            </a:pPr>
+            <a:r>
+              <a:rPr lang="en-US" sz="1600" b="1" dirty="0">
+                <a:solidFill>
+                  <a:srgbClr val="2E75B5"/>
+                </a:solidFill>
                 <a:effectLst/>
                 <a:latin typeface="Calibri" panose="020F0502020204030204" pitchFamily="34" charset="0"/>
               </a:rPr>
-              <a:t>Aruco</a:t>
-            </a:r>
-            <a:r>
-              <a:rPr lang="en-US" sz="1600" dirty="0">
-                <a:effectLst/>
-                <a:latin typeface="Calibri" panose="020F0502020204030204" pitchFamily="34" charset="0"/>
-              </a:rPr>
-              <a:t> markers and display a plus sign on the </a:t>
-            </a:r>
-            <a:r>
-              <a:rPr lang="en-US" sz="1600" dirty="0" err="1">
-                <a:effectLst/>
-                <a:latin typeface="Calibri" panose="020F0502020204030204" pitchFamily="34" charset="0"/>
-              </a:rPr>
-              <a:t>centre</a:t>
-            </a:r>
-            <a:r>
-              <a:rPr lang="en-US" sz="1600" dirty="0">
-                <a:effectLst/>
-                <a:latin typeface="Calibri" panose="020F0502020204030204" pitchFamily="34" charset="0"/>
-              </a:rPr>
-              <a:t> of the </a:t>
-            </a:r>
-            <a:r>
-              <a:rPr lang="en-US" sz="1600" dirty="0" err="1">
-                <a:effectLst/>
-                <a:latin typeface="Calibri" panose="020F0502020204030204" pitchFamily="34" charset="0"/>
-              </a:rPr>
-              <a:t>Aruco</a:t>
-            </a:r>
-            <a:r>
-              <a:rPr lang="en-US" sz="1600" dirty="0">
-                <a:effectLst/>
-                <a:latin typeface="Calibri" panose="020F0502020204030204" pitchFamily="34" charset="0"/>
-              </a:rPr>
-              <a:t> markers in the 3D point cloud.</a:t>
-            </a:r>
-          </a:p>
-          <a:p>
-            <a:pPr rtl="0" fontAlgn="ctr">
+              <a:t>2022/12/02 10am-12am</a:t>
+            </a:r>
+          </a:p>
+          <a:p>
+            <a:pPr marL="285750" marR="0" indent="-285750">
               <a:spcBef>
                 <a:spcPts val="0"/>
               </a:spcBef>
@@ -4304,71 +4366,34 @@
             </a:pPr>
             <a:r>
               <a:rPr lang="en-US" sz="1600" dirty="0">
-                <a:effectLst/>
+                <a:solidFill>
+                  <a:srgbClr val="000000"/>
+                </a:solidFill>
                 <a:latin typeface="Calibri" panose="020F0502020204030204" pitchFamily="34" charset="0"/>
               </a:rPr>
-              <a:t>Started working on camera calibration with lens</a:t>
-            </a:r>
-          </a:p>
-          <a:p>
-            <a:pPr marL="0" marR="0">
-              <a:spcBef>
-                <a:spcPts val="0"/>
-              </a:spcBef>
-              <a:spcAft>
-                <a:spcPts val="0"/>
-              </a:spcAft>
-            </a:pPr>
-            <a:r>
-              <a:rPr lang="zh-CN" sz="1600" dirty="0">
-                <a:effectLst/>
+              <a:t>Look up the information about self-calibration using </a:t>
+            </a:r>
+            <a:r>
+              <a:rPr lang="en-US" sz="1600" dirty="0" err="1">
+                <a:solidFill>
+                  <a:srgbClr val="000000"/>
+                </a:solidFill>
                 <a:latin typeface="Calibri" panose="020F0502020204030204" pitchFamily="34" charset="0"/>
               </a:rPr>
-              <a:t> </a:t>
-            </a:r>
-          </a:p>
-          <a:p>
-            <a:pPr marL="0" marR="0">
-              <a:spcBef>
-                <a:spcPts val="0"/>
-              </a:spcBef>
-              <a:spcAft>
-                <a:spcPts val="0"/>
-              </a:spcAft>
-            </a:pPr>
-            <a:r>
-              <a:rPr lang="en-GB" sz="1600" b="1" dirty="0">
-                <a:solidFill>
-                  <a:srgbClr val="2E75B5"/>
-                </a:solidFill>
-                <a:effectLst/>
+              <a:t>Pyrealsense</a:t>
+            </a:r>
+            <a:r>
+              <a:rPr lang="en-US" sz="1600" dirty="0">
+                <a:solidFill>
+                  <a:srgbClr val="000000"/>
+                </a:solidFill>
                 <a:latin typeface="Calibri" panose="020F0502020204030204" pitchFamily="34" charset="0"/>
               </a:rPr>
-              <a:t>2022/11/</a:t>
-            </a:r>
-            <a:r>
-              <a:rPr lang="en-US" sz="1600" b="1" dirty="0">
-                <a:solidFill>
-                  <a:srgbClr val="2E75B5"/>
-                </a:solidFill>
-                <a:effectLst/>
-                <a:latin typeface="Calibri" panose="020F0502020204030204" pitchFamily="34" charset="0"/>
-              </a:rPr>
-              <a:t>15</a:t>
-            </a:r>
-            <a:r>
-              <a:rPr lang="en-GB" sz="1600" b="1" dirty="0">
-                <a:solidFill>
-                  <a:srgbClr val="2E75B5"/>
-                </a:solidFill>
-                <a:effectLst/>
-                <a:latin typeface="Calibri" panose="020F0502020204030204" pitchFamily="34" charset="0"/>
-              </a:rPr>
-              <a:t> (2pm — 6pm)</a:t>
-            </a:r>
-          </a:p>
-          <a:p>
-            <a:pPr rtl="0" fontAlgn="ctr">
+              <a:t> camera</a:t>
+            </a:r>
+          </a:p>
+          <a:p>
+            <a:pPr marL="285750" marR="0" indent="-285750">
               <a:spcBef>
                 <a:spcPts val="0"/>
               </a:spcBef>
@@ -4378,16 +4403,34 @@
               <a:buFont typeface="Arial" panose="020B0604020202020204" pitchFamily="34" charset="0"/>
               <a:buChar char="•"/>
             </a:pPr>
-            <a:r>
-              <a:rPr lang="en-US" sz="1600" dirty="0">
-                <a:effectLst/>
+            <a:endParaRPr lang="en-US" sz="1600" dirty="0">
+              <a:solidFill>
+                <a:srgbClr val="000000"/>
+              </a:solidFill>
+              <a:latin typeface="Calibri" panose="020F0502020204030204" pitchFamily="34" charset="0"/>
+            </a:endParaRPr>
+          </a:p>
+          <a:p>
+            <a:pPr marL="0" marR="0">
+              <a:spcBef>
+                <a:spcPts val="0"/>
+              </a:spcBef>
+              <a:spcAft>
+                <a:spcPts val="0"/>
+              </a:spcAft>
+            </a:pPr>
+            <a:r>
+              <a:rPr lang="en-US" sz="1600" b="1" dirty="0">
+                <a:solidFill>
+                  <a:srgbClr val="2E75B5"/>
+                </a:solidFill>
                 <a:latin typeface="Calibri" panose="020F0502020204030204" pitchFamily="34" charset="0"/>
               </a:rPr>
-              <a:t>Started working on the GUI</a:t>
-            </a:r>
-          </a:p>
-          <a:p>
-            <a:pPr rtl="0" fontAlgn="ctr">
+              <a:t>2022/12/03 1pm-6pm</a:t>
+            </a:r>
+          </a:p>
+          <a:p>
+            <a:pPr marL="285750" marR="0" indent="-285750">
               <a:spcBef>
                 <a:spcPts val="0"/>
               </a:spcBef>
@@ -4399,252 +4442,30 @@
             </a:pPr>
             <a:r>
               <a:rPr lang="en-US" sz="1600" dirty="0">
-                <a:effectLst/>
+                <a:solidFill>
+                  <a:srgbClr val="000000"/>
+                </a:solidFill>
                 <a:latin typeface="Calibri" panose="020F0502020204030204" pitchFamily="34" charset="0"/>
               </a:rPr>
-              <a:t>Started working on pose estimation programs</a:t>
-            </a:r>
-          </a:p>
-          <a:p>
-            <a:pPr rtl="0" fontAlgn="ctr">
-              <a:spcBef>
-                <a:spcPts val="0"/>
-              </a:spcBef>
-              <a:spcAft>
-                <a:spcPts val="0"/>
-              </a:spcAft>
-              <a:buFont typeface="Arial" panose="020B0604020202020204" pitchFamily="34" charset="0"/>
-              <a:buChar char="•"/>
-            </a:pPr>
-            <a:r>
-              <a:rPr lang="en-US" sz="1600" dirty="0">
-                <a:effectLst/>
+              <a:t>Using Intel RealSense Viewer for On-chip Calibration, Tare </a:t>
+            </a:r>
+            <a:r>
+              <a:rPr lang="en-US" sz="1600" dirty="0" err="1">
+                <a:solidFill>
+                  <a:srgbClr val="000000"/>
+                </a:solidFill>
                 <a:latin typeface="Calibri" panose="020F0502020204030204" pitchFamily="34" charset="0"/>
               </a:rPr>
-              <a:t>Researched RGB to D calibration with lens but didn't get solutions</a:t>
-            </a:r>
-          </a:p>
-          <a:p>
-            <a:pPr rtl="0" fontAlgn="ctr">
-              <a:spcBef>
-                <a:spcPts val="0"/>
-              </a:spcBef>
-              <a:spcAft>
-                <a:spcPts val="0"/>
-              </a:spcAft>
-              <a:buFont typeface="Arial" panose="020B0604020202020204" pitchFamily="34" charset="0"/>
-              <a:buChar char="•"/>
-            </a:pPr>
+              <a:t>clibration</a:t>
+            </a:r>
             <a:r>
               <a:rPr lang="en-US" sz="1600" dirty="0">
-                <a:effectLst/>
+                <a:solidFill>
+                  <a:srgbClr val="000000"/>
+                </a:solidFill>
                 <a:latin typeface="Calibri" panose="020F0502020204030204" pitchFamily="34" charset="0"/>
               </a:rPr>
-              <a:t>Discussed with TA </a:t>
-            </a:r>
-            <a:r>
-              <a:rPr lang="en-US" sz="1600" dirty="0" err="1">
-                <a:effectLst/>
-                <a:latin typeface="Calibri" panose="020F0502020204030204" pitchFamily="34" charset="0"/>
-              </a:rPr>
-              <a:t>Kaizhong</a:t>
-            </a:r>
-            <a:r>
-              <a:rPr lang="en-US" sz="1600" dirty="0">
-                <a:effectLst/>
-                <a:latin typeface="Calibri" panose="020F0502020204030204" pitchFamily="34" charset="0"/>
-              </a:rPr>
-              <a:t> and decided the plan: work on GUI, pose estimation and only calibrate the RGB camera  (might try to get a transformation matrix between results with lens and without lens)</a:t>
-            </a:r>
-          </a:p>
-          <a:p>
-            <a:pPr marL="0" marR="0">
-              <a:spcBef>
-                <a:spcPts val="0"/>
-              </a:spcBef>
-              <a:spcAft>
-                <a:spcPts val="0"/>
-              </a:spcAft>
-            </a:pPr>
-            <a:r>
-              <a:rPr lang="en-US" sz="1600" dirty="0">
-                <a:effectLst/>
-                <a:latin typeface="Calibri" panose="020F0502020204030204" pitchFamily="34" charset="0"/>
-              </a:rPr>
-              <a:t> </a:t>
-            </a:r>
-          </a:p>
-          <a:p>
-            <a:pPr marL="0" marR="0">
-              <a:spcBef>
-                <a:spcPts val="0"/>
-              </a:spcBef>
-              <a:spcAft>
-                <a:spcPts val="0"/>
-              </a:spcAft>
-            </a:pPr>
-            <a:r>
-              <a:rPr lang="en-GB" sz="1600" b="1" dirty="0">
-                <a:solidFill>
-                  <a:srgbClr val="2E75B5"/>
-                </a:solidFill>
-                <a:effectLst/>
-                <a:latin typeface="Calibri" panose="020F0502020204030204" pitchFamily="34" charset="0"/>
-              </a:rPr>
-              <a:t>2022/11/17 (10am — 1pm)</a:t>
-            </a:r>
-          </a:p>
-          <a:p>
-            <a:pPr rtl="0" fontAlgn="ctr">
-              <a:spcBef>
-                <a:spcPts val="0"/>
-              </a:spcBef>
-              <a:spcAft>
-                <a:spcPts val="0"/>
-              </a:spcAft>
-              <a:buFont typeface="Arial" panose="020B0604020202020204" pitchFamily="34" charset="0"/>
-              <a:buChar char="•"/>
-            </a:pPr>
-            <a:r>
-              <a:rPr lang="en-US" sz="1600" dirty="0">
-                <a:effectLst/>
-                <a:latin typeface="Calibri" panose="020F0502020204030204" pitchFamily="34" charset="0"/>
-              </a:rPr>
-              <a:t>Looked up GUI libraries and discussed which to be used</a:t>
-            </a:r>
-          </a:p>
-          <a:p>
-            <a:pPr rtl="0" fontAlgn="ctr">
-              <a:spcBef>
-                <a:spcPts val="0"/>
-              </a:spcBef>
-              <a:spcAft>
-                <a:spcPts val="0"/>
-              </a:spcAft>
-              <a:buFont typeface="Arial" panose="020B0604020202020204" pitchFamily="34" charset="0"/>
-              <a:buChar char="•"/>
-            </a:pPr>
-            <a:r>
-              <a:rPr lang="en-US" sz="1600" dirty="0">
-                <a:effectLst/>
-                <a:latin typeface="Calibri" panose="020F0502020204030204" pitchFamily="34" charset="0"/>
-              </a:rPr>
-              <a:t>Decided how to visualize the pose</a:t>
-            </a:r>
-          </a:p>
-          <a:p>
-            <a:pPr marL="0" marR="0">
-              <a:spcBef>
-                <a:spcPts val="0"/>
-              </a:spcBef>
-              <a:spcAft>
-                <a:spcPts val="0"/>
-              </a:spcAft>
-            </a:pPr>
-            <a:r>
-              <a:rPr lang="en-US" sz="1600" dirty="0">
-                <a:effectLst/>
-                <a:latin typeface="Calibri" panose="020F0502020204030204" pitchFamily="34" charset="0"/>
-              </a:rPr>
-              <a:t> </a:t>
-            </a:r>
-          </a:p>
-          <a:p>
-            <a:pPr marL="0" marR="0">
-              <a:spcBef>
-                <a:spcPts val="0"/>
-              </a:spcBef>
-              <a:spcAft>
-                <a:spcPts val="0"/>
-              </a:spcAft>
-            </a:pPr>
-            <a:r>
-              <a:rPr lang="en-GB" sz="1600" b="1" dirty="0">
-                <a:solidFill>
-                  <a:srgbClr val="2E75B5"/>
-                </a:solidFill>
-                <a:effectLst/>
-                <a:latin typeface="Calibri" panose="020F0502020204030204" pitchFamily="34" charset="0"/>
-              </a:rPr>
-              <a:t>2022/11/18 (10am — 1pm)</a:t>
-            </a:r>
-          </a:p>
-          <a:p>
-            <a:pPr rtl="0" fontAlgn="ctr">
-              <a:spcBef>
-                <a:spcPts val="0"/>
-              </a:spcBef>
-              <a:spcAft>
-                <a:spcPts val="0"/>
-              </a:spcAft>
-              <a:buFont typeface="Arial" panose="020B0604020202020204" pitchFamily="34" charset="0"/>
-              <a:buChar char="•"/>
-            </a:pPr>
-            <a:r>
-              <a:rPr lang="en-US" sz="1600" dirty="0">
-                <a:effectLst/>
-                <a:latin typeface="Calibri" panose="020F0502020204030204" pitchFamily="34" charset="0"/>
-              </a:rPr>
-              <a:t>Worked on </a:t>
-            </a:r>
-            <a:r>
-              <a:rPr lang="en-US" sz="1600" dirty="0" err="1">
-                <a:effectLst/>
-                <a:latin typeface="Calibri" panose="020F0502020204030204" pitchFamily="34" charset="0"/>
-              </a:rPr>
-              <a:t>Aruco</a:t>
-            </a:r>
-            <a:r>
-              <a:rPr lang="en-US" sz="1600" dirty="0">
-                <a:effectLst/>
-                <a:latin typeface="Calibri" panose="020F0502020204030204" pitchFamily="34" charset="0"/>
-              </a:rPr>
-              <a:t> pose calculation</a:t>
-            </a:r>
-          </a:p>
-          <a:p>
-            <a:pPr rtl="0" fontAlgn="ctr">
-              <a:spcBef>
-                <a:spcPts val="0"/>
-              </a:spcBef>
-              <a:spcAft>
-                <a:spcPts val="0"/>
-              </a:spcAft>
-              <a:buFont typeface="Arial" panose="020B0604020202020204" pitchFamily="34" charset="0"/>
-              <a:buChar char="•"/>
-            </a:pPr>
-            <a:r>
-              <a:rPr lang="en-US" sz="1600" dirty="0">
-                <a:effectLst/>
-                <a:latin typeface="Calibri" panose="020F0502020204030204" pitchFamily="34" charset="0"/>
-              </a:rPr>
-              <a:t>Added GUI functions</a:t>
-            </a:r>
-          </a:p>
-          <a:p>
-            <a:pPr rtl="0" fontAlgn="ctr">
-              <a:spcBef>
-                <a:spcPts val="0"/>
-              </a:spcBef>
-              <a:spcAft>
-                <a:spcPts val="0"/>
-              </a:spcAft>
-              <a:buFont typeface="Arial" panose="020B0604020202020204" pitchFamily="34" charset="0"/>
-              <a:buChar char="•"/>
-            </a:pPr>
-            <a:r>
-              <a:rPr lang="en-US" sz="1600" dirty="0" err="1">
-                <a:effectLst/>
-                <a:latin typeface="Calibri" panose="020F0502020204030204" pitchFamily="34" charset="0"/>
-              </a:rPr>
-              <a:t>Finalised</a:t>
-            </a:r>
-            <a:r>
-              <a:rPr lang="en-US" sz="1600" dirty="0">
-                <a:effectLst/>
-                <a:latin typeface="Calibri" panose="020F0502020204030204" pitchFamily="34" charset="0"/>
-              </a:rPr>
-              <a:t> marker design</a:t>
+              <a:t>, focus-length calibration</a:t>
             </a:r>
           </a:p>
         </p:txBody>

</xml_diff>